<commit_message>
add sc exp design
</commit_message>
<xml_diff>
--- a/singlecell/singlecellRNAseq-expDesign.pptx
+++ b/singlecell/singlecellRNAseq-expDesign.pptx
@@ -5,30 +5,28 @@
     <p:sldMasterId id="2147483648" r:id="rId1"/>
   </p:sldMasterIdLst>
   <p:notesMasterIdLst>
-    <p:notesMasterId r:id="rId23"/>
+    <p:notesMasterId r:id="rId21"/>
   </p:notesMasterIdLst>
   <p:sldIdLst>
     <p:sldId id="384" r:id="rId2"/>
     <p:sldId id="373" r:id="rId3"/>
     <p:sldId id="388" r:id="rId4"/>
     <p:sldId id="431" r:id="rId5"/>
-    <p:sldId id="432" r:id="rId6"/>
-    <p:sldId id="433" r:id="rId7"/>
-    <p:sldId id="434" r:id="rId8"/>
-    <p:sldId id="415" r:id="rId9"/>
-    <p:sldId id="430" r:id="rId10"/>
-    <p:sldId id="409" r:id="rId11"/>
-    <p:sldId id="414" r:id="rId12"/>
-    <p:sldId id="427" r:id="rId13"/>
-    <p:sldId id="411" r:id="rId14"/>
-    <p:sldId id="412" r:id="rId15"/>
-    <p:sldId id="428" r:id="rId16"/>
-    <p:sldId id="424" r:id="rId17"/>
-    <p:sldId id="426" r:id="rId18"/>
-    <p:sldId id="417" r:id="rId19"/>
-    <p:sldId id="429" r:id="rId20"/>
-    <p:sldId id="416" r:id="rId21"/>
-    <p:sldId id="290" r:id="rId22"/>
+    <p:sldId id="433" r:id="rId6"/>
+    <p:sldId id="434" r:id="rId7"/>
+    <p:sldId id="415" r:id="rId8"/>
+    <p:sldId id="430" r:id="rId9"/>
+    <p:sldId id="409" r:id="rId10"/>
+    <p:sldId id="432" r:id="rId11"/>
+    <p:sldId id="427" r:id="rId12"/>
+    <p:sldId id="411" r:id="rId13"/>
+    <p:sldId id="412" r:id="rId14"/>
+    <p:sldId id="428" r:id="rId15"/>
+    <p:sldId id="424" r:id="rId16"/>
+    <p:sldId id="426" r:id="rId17"/>
+    <p:sldId id="417" r:id="rId18"/>
+    <p:sldId id="416" r:id="rId19"/>
+    <p:sldId id="290" r:id="rId20"/>
   </p:sldIdLst>
   <p:sldSz cx="12192000" cy="6858000"/>
   <p:notesSz cx="6858000" cy="9144000"/>
@@ -136,13 +134,12 @@
             <p14:sldId id="373"/>
             <p14:sldId id="388"/>
             <p14:sldId id="431"/>
-            <p14:sldId id="432"/>
             <p14:sldId id="433"/>
             <p14:sldId id="434"/>
             <p14:sldId id="415"/>
             <p14:sldId id="430"/>
             <p14:sldId id="409"/>
-            <p14:sldId id="414"/>
+            <p14:sldId id="432"/>
             <p14:sldId id="427"/>
             <p14:sldId id="411"/>
             <p14:sldId id="412"/>
@@ -150,7 +147,6 @@
             <p14:sldId id="424"/>
             <p14:sldId id="426"/>
             <p14:sldId id="417"/>
-            <p14:sldId id="429"/>
             <p14:sldId id="416"/>
             <p14:sldId id="290"/>
           </p14:sldIdLst>
@@ -246,7 +242,7 @@
           <a:p>
             <a:fld id="{2BB4664A-E94C-1E48-87DE-6B2D861CC4E3}" type="datetimeFigureOut">
               <a:rPr lang="en-US" smtClean="0"/>
-              <a:t>11/24/19</a:t>
+              <a:t>5/18/20</a:t>
             </a:fld>
             <a:endParaRPr lang="en-US"/>
           </a:p>
@@ -803,7 +799,7 @@
           <a:p>
             <a:fld id="{E70F27B2-3269-4E45-84E0-3A554EA5F6EB}" type="datetimeFigureOut">
               <a:rPr lang="en-US" smtClean="0"/>
-              <a:t>11/24/19</a:t>
+              <a:t>5/18/20</a:t>
             </a:fld>
             <a:endParaRPr lang="en-US"/>
           </a:p>
@@ -971,7 +967,7 @@
           <a:p>
             <a:fld id="{E70F27B2-3269-4E45-84E0-3A554EA5F6EB}" type="datetimeFigureOut">
               <a:rPr lang="en-US" smtClean="0"/>
-              <a:t>11/24/19</a:t>
+              <a:t>5/18/20</a:t>
             </a:fld>
             <a:endParaRPr lang="en-US"/>
           </a:p>
@@ -1149,7 +1145,7 @@
           <a:p>
             <a:fld id="{E70F27B2-3269-4E45-84E0-3A554EA5F6EB}" type="datetimeFigureOut">
               <a:rPr lang="en-US" smtClean="0"/>
-              <a:t>11/24/19</a:t>
+              <a:t>5/18/20</a:t>
             </a:fld>
             <a:endParaRPr lang="en-US"/>
           </a:p>
@@ -1460,7 +1456,7 @@
           <a:p>
             <a:fld id="{E70F27B2-3269-4E45-84E0-3A554EA5F6EB}" type="datetimeFigureOut">
               <a:rPr lang="en-US" smtClean="0"/>
-              <a:t>11/24/19</a:t>
+              <a:t>5/18/20</a:t>
             </a:fld>
             <a:endParaRPr lang="en-US"/>
           </a:p>
@@ -1705,7 +1701,7 @@
           <a:p>
             <a:fld id="{E70F27B2-3269-4E45-84E0-3A554EA5F6EB}" type="datetimeFigureOut">
               <a:rPr lang="en-US" smtClean="0"/>
-              <a:t>11/24/19</a:t>
+              <a:t>5/18/20</a:t>
             </a:fld>
             <a:endParaRPr lang="en-US"/>
           </a:p>
@@ -1934,7 +1930,7 @@
           <a:p>
             <a:fld id="{E70F27B2-3269-4E45-84E0-3A554EA5F6EB}" type="datetimeFigureOut">
               <a:rPr lang="en-US" smtClean="0"/>
-              <a:t>11/24/19</a:t>
+              <a:t>5/18/20</a:t>
             </a:fld>
             <a:endParaRPr lang="en-US"/>
           </a:p>
@@ -2298,7 +2294,7 @@
           <a:p>
             <a:fld id="{E70F27B2-3269-4E45-84E0-3A554EA5F6EB}" type="datetimeFigureOut">
               <a:rPr lang="en-US" smtClean="0"/>
-              <a:t>11/24/19</a:t>
+              <a:t>5/18/20</a:t>
             </a:fld>
             <a:endParaRPr lang="en-US"/>
           </a:p>
@@ -2415,7 +2411,7 @@
           <a:p>
             <a:fld id="{E70F27B2-3269-4E45-84E0-3A554EA5F6EB}" type="datetimeFigureOut">
               <a:rPr lang="en-US" smtClean="0"/>
-              <a:t>11/24/19</a:t>
+              <a:t>5/18/20</a:t>
             </a:fld>
             <a:endParaRPr lang="en-US"/>
           </a:p>
@@ -2510,7 +2506,7 @@
           <a:p>
             <a:fld id="{E70F27B2-3269-4E45-84E0-3A554EA5F6EB}" type="datetimeFigureOut">
               <a:rPr lang="en-US" smtClean="0"/>
-              <a:t>11/24/19</a:t>
+              <a:t>5/18/20</a:t>
             </a:fld>
             <a:endParaRPr lang="en-US"/>
           </a:p>
@@ -2785,7 +2781,7 @@
           <a:p>
             <a:fld id="{E70F27B2-3269-4E45-84E0-3A554EA5F6EB}" type="datetimeFigureOut">
               <a:rPr lang="en-US" smtClean="0"/>
-              <a:t>11/24/19</a:t>
+              <a:t>5/18/20</a:t>
             </a:fld>
             <a:endParaRPr lang="en-US"/>
           </a:p>
@@ -3037,7 +3033,7 @@
           <a:p>
             <a:fld id="{E70F27B2-3269-4E45-84E0-3A554EA5F6EB}" type="datetimeFigureOut">
               <a:rPr lang="en-US" smtClean="0"/>
-              <a:t>11/24/19</a:t>
+              <a:t>5/18/20</a:t>
             </a:fld>
             <a:endParaRPr lang="en-US"/>
           </a:p>
@@ -3248,7 +3244,7 @@
           <a:p>
             <a:fld id="{E70F27B2-3269-4E45-84E0-3A554EA5F6EB}" type="datetimeFigureOut">
               <a:rPr lang="en-US" smtClean="0"/>
-              <a:t>11/24/19</a:t>
+              <a:t>5/18/20</a:t>
             </a:fld>
             <a:endParaRPr lang="en-US"/>
           </a:p>
@@ -3944,7 +3940,13 @@
       </p:grpSpPr>
       <p:sp>
         <p:nvSpPr>
-          <p:cNvPr id="3" name="Title 2"/>
+          <p:cNvPr id="2" name="Title 1">
+            <a:extLst>
+              <a:ext uri="{FF2B5EF4-FFF2-40B4-BE49-F238E27FC236}">
+                <a16:creationId xmlns:a16="http://schemas.microsoft.com/office/drawing/2014/main" id="{39EA801D-4556-114F-BAD7-77A2C0802648}"/>
+              </a:ext>
+            </a:extLst>
+          </p:cNvPr>
           <p:cNvSpPr>
             <a:spLocks noGrp="1"/>
           </p:cNvSpPr>
@@ -3959,89 +3961,126 @@
           <a:p>
             <a:r>
               <a:rPr lang="en-US" dirty="0"/>
-              <a:t>General rules for preparing samples</a:t>
-            </a:r>
-          </a:p>
-        </p:txBody>
-      </p:sp>
-      <p:sp>
-        <p:nvSpPr>
-          <p:cNvPr id="2" name="Content Placeholder 1"/>
-          <p:cNvSpPr>
-            <a:spLocks noGrp="1"/>
-          </p:cNvSpPr>
+              <a:t>Multiplexing – cell hashing</a:t>
+            </a:r>
+          </a:p>
+        </p:txBody>
+      </p:sp>
+      <p:pic>
+        <p:nvPicPr>
+          <p:cNvPr id="6" name="Content Placeholder 5" descr="A close up of a map&#10;&#10;Description automatically generated">
+            <a:extLst>
+              <a:ext uri="{FF2B5EF4-FFF2-40B4-BE49-F238E27FC236}">
+                <a16:creationId xmlns:a16="http://schemas.microsoft.com/office/drawing/2014/main" id="{81A6D0C7-9275-C545-9E89-9E07734DD29C}"/>
+              </a:ext>
+            </a:extLst>
+          </p:cNvPr>
+          <p:cNvPicPr>
+            <a:picLocks noGrp="1" noChangeAspect="1"/>
+          </p:cNvPicPr>
           <p:nvPr>
             <p:ph idx="1"/>
           </p:nvPr>
-        </p:nvSpPr>
+        </p:nvPicPr>
+        <p:blipFill>
+          <a:blip r:embed="rId2"/>
+          <a:stretch>
+            <a:fillRect/>
+          </a:stretch>
+        </p:blipFill>
         <p:spPr>
           <a:xfrm>
-            <a:off x="1020726" y="1690688"/>
-            <a:ext cx="10100930" cy="4347041"/>
+            <a:off x="2911219" y="1330987"/>
+            <a:ext cx="6612609" cy="5347587"/>
           </a:xfrm>
         </p:spPr>
-        <p:txBody>
-          <a:bodyPr>
-            <a:noAutofit/>
+      </p:pic>
+      <p:sp>
+        <p:nvSpPr>
+          <p:cNvPr id="4" name="Rectangle 3">
+            <a:extLst>
+              <a:ext uri="{FF2B5EF4-FFF2-40B4-BE49-F238E27FC236}">
+                <a16:creationId xmlns:a16="http://schemas.microsoft.com/office/drawing/2014/main" id="{ECFF052D-B254-6145-B820-C63B4CDD7945}"/>
+              </a:ext>
+            </a:extLst>
+          </p:cNvPr>
+          <p:cNvSpPr/>
+          <p:nvPr/>
+        </p:nvSpPr>
+        <p:spPr>
+          <a:xfrm>
+            <a:off x="5806085" y="228545"/>
+            <a:ext cx="6385915" cy="369332"/>
+          </a:xfrm>
+          <a:prstGeom prst="rect">
+            <a:avLst/>
+          </a:prstGeom>
+        </p:spPr>
+        <p:txBody>
+          <a:bodyPr wrap="none">
+            <a:spAutoFit/>
           </a:bodyPr>
           <a:lstStyle/>
           <a:p>
             <a:r>
-              <a:rPr lang="en-US" sz="2400" dirty="0"/>
-              <a:t>Prepare more samples then you are going to need, i.e. expect some will be of poor quality, or fail </a:t>
-            </a:r>
-          </a:p>
-          <a:p>
-            <a:r>
-              <a:rPr lang="en-US" sz="2400" dirty="0"/>
-              <a:t>Preparation stages should occur across all samples at the same time (or as close as possible) and by the same person</a:t>
-            </a:r>
-          </a:p>
-          <a:p>
-            <a:r>
-              <a:rPr lang="en-US" sz="2400" dirty="0"/>
-              <a:t>Spend time practicing a new technique to produce the highest quality product you can, reliably</a:t>
-            </a:r>
-          </a:p>
-          <a:p>
-            <a:r>
-              <a:rPr lang="en-US" sz="2400" strike="sngStrike" dirty="0"/>
-              <a:t>Quality should be established using Fragment analysis traces (pseudo-gel images, RNA RIN &gt; 7.0)</a:t>
-            </a:r>
-          </a:p>
-          <a:p>
-            <a:r>
-              <a:rPr lang="en-US" sz="2400" strike="sngStrike" dirty="0"/>
-              <a:t>DNA/RNA should not be degraded</a:t>
-            </a:r>
-          </a:p>
-          <a:p>
-            <a:pPr lvl="1"/>
-            <a:r>
-              <a:rPr lang="en-US" sz="2000" strike="sngStrike" dirty="0"/>
-              <a:t>260/280 ratios for RNA should be approximately 2.0 and 260/230 should be between 2.0 and 2.2. Values over 1.8 are acceptable</a:t>
-            </a:r>
-          </a:p>
-          <a:p>
-            <a:r>
-              <a:rPr lang="en-US" sz="2400" strike="sngStrike" dirty="0"/>
-              <a:t>Quantity should be determined with a </a:t>
-            </a:r>
-            <a:r>
-              <a:rPr lang="en-US" sz="2400" strike="sngStrike" dirty="0" err="1"/>
-              <a:t>Fluorometer</a:t>
-            </a:r>
-            <a:r>
-              <a:rPr lang="en-US" sz="2400" strike="sngStrike" dirty="0"/>
-              <a:t>, such as a Qubit.</a:t>
-            </a:r>
+              <a:rPr lang="en-US" dirty="0" err="1"/>
+              <a:t>MULTIseq</a:t>
+            </a:r>
+            <a:r>
+              <a:rPr lang="en-US" dirty="0"/>
+              <a:t> - </a:t>
+            </a:r>
+            <a:r>
+              <a:rPr lang="en-US" dirty="0">
+                <a:hlinkClick r:id="rId3"/>
+              </a:rPr>
+              <a:t>https://www.nature.com/articles/s41592-019-0433-8</a:t>
+            </a:r>
+            <a:endParaRPr lang="en-US" dirty="0"/>
+          </a:p>
+        </p:txBody>
+      </p:sp>
+      <p:sp>
+        <p:nvSpPr>
+          <p:cNvPr id="3" name="Rectangle 2">
+            <a:extLst>
+              <a:ext uri="{FF2B5EF4-FFF2-40B4-BE49-F238E27FC236}">
+                <a16:creationId xmlns:a16="http://schemas.microsoft.com/office/drawing/2014/main" id="{4826E289-B70E-494B-9588-AD0DD6723213}"/>
+              </a:ext>
+            </a:extLst>
+          </p:cNvPr>
+          <p:cNvSpPr/>
+          <p:nvPr/>
+        </p:nvSpPr>
+        <p:spPr>
+          <a:xfrm>
+            <a:off x="8921288" y="658574"/>
+            <a:ext cx="3155800" cy="369332"/>
+          </a:xfrm>
+          <a:prstGeom prst="rect">
+            <a:avLst/>
+          </a:prstGeom>
+        </p:spPr>
+        <p:txBody>
+          <a:bodyPr wrap="none">
+            <a:spAutoFit/>
+          </a:bodyPr>
+          <a:lstStyle/>
+          <a:p>
+            <a:r>
+              <a:rPr lang="en-US" dirty="0">
+                <a:hlinkClick r:id="rId4"/>
+              </a:rPr>
+              <a:t>https://satijalab.org/costpercell</a:t>
+            </a:r>
+            <a:endParaRPr lang="en-US" dirty="0"/>
           </a:p>
         </p:txBody>
       </p:sp>
     </p:spTree>
     <p:extLst>
       <p:ext uri="{BB962C8B-B14F-4D97-AF65-F5344CB8AC3E}">
-        <p14:creationId xmlns:p14="http://schemas.microsoft.com/office/powerpoint/2010/main" val="569050726"/>
+        <p14:creationId xmlns:p14="http://schemas.microsoft.com/office/powerpoint/2010/main" val="3426494592"/>
       </p:ext>
     </p:extLst>
   </p:cSld>
@@ -4070,7 +4109,7 @@
       </p:grpSpPr>
       <p:sp>
         <p:nvSpPr>
-          <p:cNvPr id="3" name="Title 2"/>
+          <p:cNvPr id="2" name="Title 1"/>
           <p:cNvSpPr>
             <a:spLocks noGrp="1"/>
           </p:cNvSpPr>
@@ -4084,236 +4123,8 @@
           <a:lstStyle/>
           <a:p>
             <a:r>
-              <a:rPr lang="en-US" dirty="0">
-                <a:solidFill>
-                  <a:srgbClr val="FF0000"/>
-                </a:solidFill>
-              </a:rPr>
-              <a:t>Comparison to </a:t>
-            </a:r>
-            <a:r>
               <a:rPr lang="en-US" dirty="0"/>
-              <a:t>RNA-</a:t>
-            </a:r>
-            <a:r>
-              <a:rPr lang="en-US" dirty="0" err="1"/>
-              <a:t>seq</a:t>
-            </a:r>
-            <a:r>
-              <a:rPr lang="en-US" dirty="0"/>
-              <a:t> libraries</a:t>
-            </a:r>
-          </a:p>
-        </p:txBody>
-      </p:sp>
-      <p:sp>
-        <p:nvSpPr>
-          <p:cNvPr id="2" name="Content Placeholder 1"/>
-          <p:cNvSpPr>
-            <a:spLocks noGrp="1"/>
-          </p:cNvSpPr>
-          <p:nvPr>
-            <p:ph idx="1"/>
-          </p:nvPr>
-        </p:nvSpPr>
-        <p:spPr/>
-        <p:txBody>
-          <a:bodyPr>
-            <a:normAutofit/>
-          </a:bodyPr>
-          <a:lstStyle/>
-          <a:p>
-            <a:pPr marL="45720" indent="0">
-              <a:buNone/>
-            </a:pPr>
-            <a:r>
-              <a:rPr lang="en-US" dirty="0"/>
-              <a:t>Considerations</a:t>
-            </a:r>
-          </a:p>
-          <a:p>
-            <a:r>
-              <a:rPr lang="en-US" dirty="0"/>
-              <a:t>QA/QC of </a:t>
-            </a:r>
-            <a:r>
-              <a:rPr lang="en-US" strike="sngStrike" dirty="0"/>
-              <a:t>RNA samples</a:t>
-            </a:r>
-            <a:r>
-              <a:rPr lang="en-US" dirty="0"/>
-              <a:t> Cells </a:t>
-            </a:r>
-            <a:r>
-              <a:rPr lang="en-US" sz="2400" dirty="0">
-                <a:solidFill>
-                  <a:srgbClr val="FF0000"/>
-                </a:solidFill>
-              </a:rPr>
-              <a:t>[Consistency across samples is most important.]</a:t>
-            </a:r>
-          </a:p>
-          <a:p>
-            <a:pPr marL="457200" lvl="1" indent="0">
-              <a:buNone/>
-            </a:pPr>
-            <a:r>
-              <a:rPr lang="en-US" sz="2000" dirty="0">
-                <a:solidFill>
-                  <a:srgbClr val="FF0000"/>
-                </a:solidFill>
-              </a:rPr>
-              <a:t>‘Cleanliness’ of cells and accurate cell counts</a:t>
-            </a:r>
-          </a:p>
-          <a:p>
-            <a:r>
-              <a:rPr lang="en-US" dirty="0"/>
-              <a:t>What is the RNA of interest </a:t>
-            </a:r>
-            <a:r>
-              <a:rPr lang="en-US" sz="2400" dirty="0">
-                <a:solidFill>
-                  <a:srgbClr val="FF0000"/>
-                </a:solidFill>
-              </a:rPr>
-              <a:t>[</a:t>
-            </a:r>
-            <a:r>
-              <a:rPr lang="en-US" sz="2400" dirty="0" err="1">
-                <a:solidFill>
-                  <a:srgbClr val="FF0000"/>
-                </a:solidFill>
-              </a:rPr>
-              <a:t>polyA</a:t>
-            </a:r>
-            <a:r>
-              <a:rPr lang="en-US" sz="2400" dirty="0">
-                <a:solidFill>
-                  <a:srgbClr val="FF0000"/>
-                </a:solidFill>
-              </a:rPr>
-              <a:t> extraction is pretty universal]</a:t>
-            </a:r>
-            <a:endParaRPr lang="en-US" dirty="0">
-              <a:solidFill>
-                <a:srgbClr val="FF0000"/>
-              </a:solidFill>
-            </a:endParaRPr>
-          </a:p>
-          <a:p>
-            <a:r>
-              <a:rPr lang="en-US" dirty="0"/>
-              <a:t>Library Preparation </a:t>
-            </a:r>
-          </a:p>
-          <a:p>
-            <a:pPr lvl="1"/>
-            <a:r>
-              <a:rPr lang="en-US" dirty="0"/>
-              <a:t>Stranded Vs. </a:t>
-            </a:r>
-            <a:r>
-              <a:rPr lang="en-US" dirty="0" err="1"/>
-              <a:t>Unstranded</a:t>
-            </a:r>
-            <a:r>
-              <a:rPr lang="en-US" dirty="0"/>
-              <a:t> </a:t>
-            </a:r>
-            <a:r>
-              <a:rPr lang="en-US" dirty="0">
-                <a:solidFill>
-                  <a:srgbClr val="FF0000"/>
-                </a:solidFill>
-              </a:rPr>
-              <a:t>[Standard is pretty universal]</a:t>
-            </a:r>
-          </a:p>
-          <a:p>
-            <a:r>
-              <a:rPr lang="en-US" dirty="0"/>
-              <a:t>Size Selection/Cleanup </a:t>
-            </a:r>
-            <a:r>
-              <a:rPr lang="en-US" sz="2400" dirty="0">
-                <a:solidFill>
-                  <a:srgbClr val="FF0000"/>
-                </a:solidFill>
-              </a:rPr>
-              <a:t>[Target kit recommendations]</a:t>
-            </a:r>
-            <a:endParaRPr lang="en-US" dirty="0">
-              <a:solidFill>
-                <a:srgbClr val="FF0000"/>
-              </a:solidFill>
-            </a:endParaRPr>
-          </a:p>
-          <a:p>
-            <a:pPr lvl="1"/>
-            <a:r>
-              <a:rPr lang="en-US" dirty="0"/>
-              <a:t>Final QA </a:t>
-            </a:r>
-            <a:r>
-              <a:rPr lang="en-US" dirty="0">
-                <a:solidFill>
-                  <a:srgbClr val="FF0000"/>
-                </a:solidFill>
-              </a:rPr>
-              <a:t>[Consistency across samples remains most important.]</a:t>
-            </a:r>
-          </a:p>
-        </p:txBody>
-      </p:sp>
-    </p:spTree>
-    <p:extLst>
-      <p:ext uri="{BB962C8B-B14F-4D97-AF65-F5344CB8AC3E}">
-        <p14:creationId xmlns:p14="http://schemas.microsoft.com/office/powerpoint/2010/main" val="1506792281"/>
-      </p:ext>
-    </p:extLst>
-  </p:cSld>
-  <p:clrMapOvr>
-    <a:masterClrMapping/>
-  </p:clrMapOvr>
-</p:sld>
-</file>
-
-<file path=ppt/slides/slide12.xml><?xml version="1.0" encoding="utf-8"?>
-<p:sld xmlns:a="http://schemas.openxmlformats.org/drawingml/2006/main" xmlns:r="http://schemas.openxmlformats.org/officeDocument/2006/relationships" xmlns:p="http://schemas.openxmlformats.org/presentationml/2006/main">
-  <p:cSld>
-    <p:spTree>
-      <p:nvGrpSpPr>
-        <p:cNvPr id="1" name=""/>
-        <p:cNvGrpSpPr/>
-        <p:nvPr/>
-      </p:nvGrpSpPr>
-      <p:grpSpPr>
-        <a:xfrm>
-          <a:off x="0" y="0"/>
-          <a:ext cx="0" cy="0"/>
-          <a:chOff x="0" y="0"/>
-          <a:chExt cx="0" cy="0"/>
-        </a:xfrm>
-      </p:grpSpPr>
-      <p:sp>
-        <p:nvSpPr>
-          <p:cNvPr id="2" name="Title 1"/>
-          <p:cNvSpPr>
-            <a:spLocks noGrp="1"/>
-          </p:cNvSpPr>
-          <p:nvPr>
-            <p:ph type="title"/>
-          </p:nvPr>
-        </p:nvSpPr>
-        <p:spPr/>
-        <p:txBody>
-          <a:bodyPr/>
-          <a:lstStyle/>
-          <a:p>
-            <a:r>
-              <a:rPr lang="en-US" dirty="0"/>
-              <a:t>Elements of a Library</a:t>
+              <a:t>Common Elements of a Library</a:t>
             </a:r>
           </a:p>
         </p:txBody>
@@ -4448,7 +4259,7 @@
 </p:sld>
 </file>
 
-<file path=ppt/slides/slide13.xml><?xml version="1.0" encoding="utf-8"?>
+<file path=ppt/slides/slide12.xml><?xml version="1.0" encoding="utf-8"?>
 <p:sld xmlns:a="http://schemas.openxmlformats.org/drawingml/2006/main" xmlns:r="http://schemas.openxmlformats.org/officeDocument/2006/relationships" xmlns:p="http://schemas.openxmlformats.org/presentationml/2006/main">
   <p:cSld>
     <p:spTree>
@@ -4774,7 +4585,7 @@
 </p:sld>
 </file>
 
-<file path=ppt/slides/slide14.xml><?xml version="1.0" encoding="utf-8"?>
+<file path=ppt/slides/slide13.xml><?xml version="1.0" encoding="utf-8"?>
 <p:sld xmlns:a="http://schemas.openxmlformats.org/drawingml/2006/main" xmlns:r="http://schemas.openxmlformats.org/officeDocument/2006/relationships" xmlns:p="http://schemas.openxmlformats.org/presentationml/2006/main">
   <p:cSld>
     <p:spTree>
@@ -4944,7 +4755,7 @@
 </p:sld>
 </file>
 
-<file path=ppt/slides/slide15.xml><?xml version="1.0" encoding="utf-8"?>
+<file path=ppt/slides/slide14.xml><?xml version="1.0" encoding="utf-8"?>
 <p:sld xmlns:a="http://schemas.openxmlformats.org/drawingml/2006/main" xmlns:r="http://schemas.openxmlformats.org/officeDocument/2006/relationships" xmlns:p="http://schemas.openxmlformats.org/presentationml/2006/main">
   <p:cSld>
     <p:spTree>
@@ -5504,7 +5315,7 @@
 </p:sld>
 </file>
 
-<file path=ppt/slides/slide16.xml><?xml version="1.0" encoding="utf-8"?>
+<file path=ppt/slides/slide15.xml><?xml version="1.0" encoding="utf-8"?>
 <p:sld xmlns:a="http://schemas.openxmlformats.org/drawingml/2006/main" xmlns:r="http://schemas.openxmlformats.org/officeDocument/2006/relationships" xmlns:p="http://schemas.openxmlformats.org/presentationml/2006/main">
   <p:cSld>
     <p:spTree>
@@ -5585,7 +5396,7 @@
 </p:sld>
 </file>
 
-<file path=ppt/slides/slide17.xml><?xml version="1.0" encoding="utf-8"?>
+<file path=ppt/slides/slide16.xml><?xml version="1.0" encoding="utf-8"?>
 <p:sld xmlns:a="http://schemas.openxmlformats.org/drawingml/2006/main" xmlns:r="http://schemas.openxmlformats.org/officeDocument/2006/relationships" xmlns:p="http://schemas.openxmlformats.org/presentationml/2006/main">
   <p:cSld>
     <p:spTree>
@@ -5838,6 +5649,136 @@
 </p:sld>
 </file>
 
+<file path=ppt/slides/slide17.xml><?xml version="1.0" encoding="utf-8"?>
+<p:sld xmlns:a="http://schemas.openxmlformats.org/drawingml/2006/main" xmlns:r="http://schemas.openxmlformats.org/officeDocument/2006/relationships" xmlns:p="http://schemas.openxmlformats.org/presentationml/2006/main">
+  <p:cSld>
+    <p:spTree>
+      <p:nvGrpSpPr>
+        <p:cNvPr id="1" name=""/>
+        <p:cNvGrpSpPr/>
+        <p:nvPr/>
+      </p:nvGrpSpPr>
+      <p:grpSpPr>
+        <a:xfrm>
+          <a:off x="0" y="0"/>
+          <a:ext cx="0" cy="0"/>
+          <a:chOff x="0" y="0"/>
+          <a:chExt cx="0" cy="0"/>
+        </a:xfrm>
+      </p:grpSpPr>
+      <p:sp>
+        <p:nvSpPr>
+          <p:cNvPr id="3" name="Title 2"/>
+          <p:cNvSpPr>
+            <a:spLocks noGrp="1"/>
+          </p:cNvSpPr>
+          <p:nvPr>
+            <p:ph type="title"/>
+          </p:nvPr>
+        </p:nvSpPr>
+        <p:spPr/>
+        <p:txBody>
+          <a:bodyPr/>
+          <a:lstStyle/>
+          <a:p>
+            <a:r>
+              <a:rPr lang="en-US" dirty="0"/>
+              <a:t>Cost Estimation</a:t>
+            </a:r>
+          </a:p>
+        </p:txBody>
+      </p:sp>
+      <p:sp>
+        <p:nvSpPr>
+          <p:cNvPr id="2" name="Content Placeholder 1"/>
+          <p:cNvSpPr>
+            <a:spLocks noGrp="1"/>
+          </p:cNvSpPr>
+          <p:nvPr>
+            <p:ph idx="1"/>
+          </p:nvPr>
+        </p:nvSpPr>
+        <p:spPr/>
+        <p:txBody>
+          <a:bodyPr>
+            <a:normAutofit/>
+          </a:bodyPr>
+          <a:lstStyle/>
+          <a:p>
+            <a:r>
+              <a:rPr lang="en-US" dirty="0"/>
+              <a:t>Cell Isolation</a:t>
+            </a:r>
+          </a:p>
+          <a:p>
+            <a:r>
+              <a:rPr lang="en-US" dirty="0"/>
+              <a:t>Library preparation (Per sample/pool)</a:t>
+            </a:r>
+          </a:p>
+          <a:p>
+            <a:r>
+              <a:rPr lang="en-US" dirty="0"/>
+              <a:t>Sequencing (Number of lanes)</a:t>
+            </a:r>
+          </a:p>
+          <a:p>
+            <a:r>
+              <a:rPr lang="en-US" dirty="0"/>
+              <a:t>Bioinformatics</a:t>
+            </a:r>
+          </a:p>
+          <a:p>
+            <a:pPr marL="457200" lvl="1" indent="0">
+              <a:buNone/>
+            </a:pPr>
+            <a:r>
+              <a:rPr lang="en-US" dirty="0"/>
+              <a:t>General rule is to estimate the same dollar amount as data generation, i.e. double your budget</a:t>
+            </a:r>
+          </a:p>
+          <a:p>
+            <a:endParaRPr lang="en-US" dirty="0"/>
+          </a:p>
+          <a:p>
+            <a:pPr marL="45720" indent="0">
+              <a:buNone/>
+            </a:pPr>
+            <a:r>
+              <a:rPr lang="en-US" dirty="0">
+                <a:hlinkClick r:id="rId2"/>
+              </a:rPr>
+              <a:t>http://dnatech.genomecenter.ucdavis.edu/prices/</a:t>
+            </a:r>
+            <a:endParaRPr lang="en-US" dirty="0"/>
+          </a:p>
+          <a:p>
+            <a:pPr marL="45720" indent="0">
+              <a:buNone/>
+            </a:pPr>
+            <a:r>
+              <a:rPr lang="en-US" dirty="0">
+                <a:hlinkClick r:id="rId3"/>
+              </a:rPr>
+              <a:t>https://bioinformatics.ucdavis.edu/rates</a:t>
+            </a:r>
+            <a:endParaRPr lang="en-US" dirty="0"/>
+          </a:p>
+        </p:txBody>
+      </p:sp>
+    </p:spTree>
+    <p:extLst>
+      <p:ext uri="{BB962C8B-B14F-4D97-AF65-F5344CB8AC3E}">
+        <p14:creationId xmlns:p14="http://schemas.microsoft.com/office/powerpoint/2010/main" val="593607352"/>
+      </p:ext>
+    </p:extLst>
+  </p:cSld>
+  <p:clrMapOvr>
+    <a:masterClrMapping/>
+  </p:clrMapOvr>
+</p:sld>
+</file>
+
 <file path=ppt/slides/slide18.xml><?xml version="1.0" encoding="utf-8"?>
 <p:sld xmlns:a="http://schemas.openxmlformats.org/drawingml/2006/main" xmlns:r="http://schemas.openxmlformats.org/officeDocument/2006/relationships" xmlns:p="http://schemas.openxmlformats.org/presentationml/2006/main">
   <p:cSld>
@@ -5857,7 +5798,7 @@
       </p:grpSpPr>
       <p:sp>
         <p:nvSpPr>
-          <p:cNvPr id="3" name="Title 2"/>
+          <p:cNvPr id="2" name="Title 1"/>
           <p:cNvSpPr>
             <a:spLocks noGrp="1"/>
           </p:cNvSpPr>
@@ -5872,99 +5813,74 @@
           <a:p>
             <a:r>
               <a:rPr lang="en-US" dirty="0"/>
-              <a:t>Cost Estimation</a:t>
-            </a:r>
-          </a:p>
-        </p:txBody>
-      </p:sp>
-      <p:sp>
-        <p:nvSpPr>
-          <p:cNvPr id="2" name="Content Placeholder 1"/>
-          <p:cNvSpPr>
-            <a:spLocks noGrp="1"/>
-          </p:cNvSpPr>
-          <p:nvPr>
-            <p:ph idx="1"/>
-          </p:nvPr>
-        </p:nvSpPr>
-        <p:spPr/>
-        <p:txBody>
-          <a:bodyPr>
-            <a:normAutofit fontScale="92500" lnSpcReduction="10000"/>
-          </a:bodyPr>
-          <a:lstStyle/>
-          <a:p>
-            <a:r>
-              <a:rPr lang="en-US" dirty="0"/>
-              <a:t>Cell Isolation</a:t>
-            </a:r>
-          </a:p>
-          <a:p>
-            <a:r>
-              <a:rPr lang="en-US" dirty="0"/>
-              <a:t>Library preparation (Per sample/pool)</a:t>
-            </a:r>
-          </a:p>
-          <a:p>
-            <a:r>
-              <a:rPr lang="en-US" dirty="0"/>
-              <a:t>Sequencing (Number of lanes)</a:t>
-            </a:r>
-          </a:p>
-          <a:p>
-            <a:r>
-              <a:rPr lang="en-US" dirty="0"/>
-              <a:t>Bioinformatics</a:t>
-            </a:r>
-          </a:p>
-          <a:p>
-            <a:pPr marL="457200" lvl="1" indent="0">
-              <a:buNone/>
-            </a:pPr>
-            <a:r>
-              <a:rPr lang="en-US" dirty="0"/>
-              <a:t>General rule is to estimate the same dollar amount as data generation, i.e. double your budget</a:t>
-            </a:r>
-          </a:p>
-          <a:p>
-            <a:endParaRPr lang="en-US" dirty="0"/>
-          </a:p>
-          <a:p>
-            <a:pPr marL="45720" indent="0">
-              <a:buNone/>
-            </a:pPr>
-            <a:r>
-              <a:rPr lang="en-US" dirty="0">
-                <a:hlinkClick r:id="rId2"/>
+              <a:t>Be Consistent</a:t>
+            </a:r>
+          </a:p>
+        </p:txBody>
+      </p:sp>
+      <p:sp>
+        <p:nvSpPr>
+          <p:cNvPr id="4" name="Rectangle 3"/>
+          <p:cNvSpPr/>
+          <p:nvPr/>
+        </p:nvSpPr>
+        <p:spPr>
+          <a:xfrm>
+            <a:off x="1307756" y="2504702"/>
+            <a:ext cx="9576487" cy="2993183"/>
+          </a:xfrm>
+          <a:prstGeom prst="rect">
+            <a:avLst/>
+          </a:prstGeom>
+          <a:solidFill>
+            <a:schemeClr val="accent6">
+              <a:lumMod val="40000"/>
+              <a:lumOff val="60000"/>
+            </a:schemeClr>
+          </a:solidFill>
+          <a:ln>
+            <a:solidFill>
+              <a:schemeClr val="accent6">
+                <a:lumMod val="60000"/>
+                <a:lumOff val="40000"/>
+              </a:schemeClr>
+            </a:solidFill>
+          </a:ln>
+        </p:spPr>
+        <p:style>
+          <a:lnRef idx="1">
+            <a:schemeClr val="accent1"/>
+          </a:lnRef>
+          <a:fillRef idx="3">
+            <a:schemeClr val="accent1"/>
+          </a:fillRef>
+          <a:effectRef idx="2">
+            <a:schemeClr val="accent1"/>
+          </a:effectRef>
+          <a:fontRef idx="minor">
+            <a:schemeClr val="lt1"/>
+          </a:fontRef>
+        </p:style>
+        <p:txBody>
+          <a:bodyPr rtlCol="0" anchor="ctr"/>
+          <a:lstStyle/>
+          <a:p>
+            <a:pPr algn="ctr"/>
+            <a:r>
+              <a:rPr lang="en-US" sz="4400" dirty="0">
+                <a:solidFill>
+                  <a:srgbClr val="FF0000"/>
+                </a:solidFill>
               </a:rPr>
-              <a:t>http://dnatech.genomecenter.ucdavis.edu/prices/</a:t>
-            </a:r>
-            <a:endParaRPr lang="en-US" dirty="0"/>
-          </a:p>
-          <a:p>
-            <a:pPr marL="45720" indent="0">
-              <a:buNone/>
-            </a:pPr>
-            <a:endParaRPr lang="en-US" dirty="0"/>
-          </a:p>
-          <a:p>
-            <a:pPr marL="45720" indent="0">
-              <a:buNone/>
-            </a:pPr>
-            <a:r>
-              <a:rPr lang="en-US" dirty="0">
-                <a:hlinkClick r:id="rId3"/>
-              </a:rPr>
-              <a:t>http://bioinformatics.ucdavis.edu/services-2/</a:t>
-            </a:r>
-            <a:endParaRPr lang="en-US" dirty="0"/>
+              <a:t>BE CONSISTENT ACROSS ALL SAMPLES!!! </a:t>
+            </a:r>
           </a:p>
         </p:txBody>
       </p:sp>
     </p:spTree>
     <p:extLst>
       <p:ext uri="{BB962C8B-B14F-4D97-AF65-F5344CB8AC3E}">
-        <p14:creationId xmlns:p14="http://schemas.microsoft.com/office/powerpoint/2010/main" val="593607352"/>
+        <p14:creationId xmlns:p14="http://schemas.microsoft.com/office/powerpoint/2010/main" val="2097040103"/>
       </p:ext>
     </p:extLst>
   </p:cSld>
@@ -5993,13 +5909,7 @@
       </p:grpSpPr>
       <p:sp>
         <p:nvSpPr>
-          <p:cNvPr id="2" name="Title 1">
-            <a:extLst>
-              <a:ext uri="{FF2B5EF4-FFF2-40B4-BE49-F238E27FC236}">
-                <a16:creationId xmlns:a16="http://schemas.microsoft.com/office/drawing/2014/main" id="{39EA801D-4556-114F-BAD7-77A2C0802648}"/>
-              </a:ext>
-            </a:extLst>
-          </p:cNvPr>
+          <p:cNvPr id="2" name="Title 1"/>
           <p:cNvSpPr>
             <a:spLocks noGrp="1"/>
           </p:cNvSpPr>
@@ -6007,96 +5917,125 @@
             <p:ph type="title"/>
           </p:nvPr>
         </p:nvSpPr>
-        <p:spPr/>
-        <p:txBody>
-          <a:bodyPr/>
-          <a:lstStyle/>
-          <a:p>
-            <a:r>
-              <a:rPr lang="en-US" dirty="0"/>
-              <a:t>Multiplexing (</a:t>
-            </a:r>
-            <a:r>
-              <a:rPr lang="en-US" dirty="0" err="1"/>
-              <a:t>MULTIseq</a:t>
-            </a:r>
-            <a:r>
-              <a:rPr lang="en-US" dirty="0"/>
-              <a:t>)</a:t>
-            </a:r>
-          </a:p>
-        </p:txBody>
-      </p:sp>
-      <p:pic>
-        <p:nvPicPr>
-          <p:cNvPr id="6" name="Content Placeholder 5" descr="A close up of a map&#10;&#10;Description automatically generated">
-            <a:extLst>
-              <a:ext uri="{FF2B5EF4-FFF2-40B4-BE49-F238E27FC236}">
-                <a16:creationId xmlns:a16="http://schemas.microsoft.com/office/drawing/2014/main" id="{81A6D0C7-9275-C545-9E89-9E07734DD29C}"/>
-              </a:ext>
-            </a:extLst>
-          </p:cNvPr>
-          <p:cNvPicPr>
-            <a:picLocks noGrp="1" noChangeAspect="1"/>
-          </p:cNvPicPr>
-          <p:nvPr>
-            <p:ph idx="1"/>
-          </p:nvPr>
-        </p:nvPicPr>
-        <p:blipFill>
-          <a:blip r:embed="rId2"/>
-          <a:stretch>
-            <a:fillRect/>
-          </a:stretch>
-        </p:blipFill>
         <p:spPr>
           <a:xfrm>
-            <a:off x="3512980" y="1196151"/>
-            <a:ext cx="6549712" cy="5296724"/>
+            <a:off x="2501384" y="273630"/>
+            <a:ext cx="7674566" cy="1143480"/>
           </a:xfrm>
         </p:spPr>
-      </p:pic>
-      <p:sp>
-        <p:nvSpPr>
-          <p:cNvPr id="4" name="Rectangle 3">
-            <a:extLst>
-              <a:ext uri="{FF2B5EF4-FFF2-40B4-BE49-F238E27FC236}">
-                <a16:creationId xmlns:a16="http://schemas.microsoft.com/office/drawing/2014/main" id="{ECFF052D-B254-6145-B820-C63B4CDD7945}"/>
-              </a:ext>
-            </a:extLst>
-          </p:cNvPr>
-          <p:cNvSpPr/>
+        <p:txBody>
+          <a:bodyPr>
+            <a:normAutofit fontScale="90000"/>
+          </a:bodyPr>
+          <a:lstStyle/>
+          <a:p>
+            <a:r>
+              <a:rPr lang="en-US" b="1" dirty="0"/>
+              <a:t>The Bottom Line:</a:t>
+            </a:r>
+            <a:br>
+              <a:rPr lang="en-US" b="1" dirty="0"/>
+            </a:br>
+            <a:r>
+              <a:rPr lang="en-US" sz="4355" dirty="0"/>
+              <a:t>In Genomics</a:t>
+            </a:r>
+          </a:p>
+        </p:txBody>
+      </p:sp>
+      <p:sp>
+        <p:nvSpPr>
+          <p:cNvPr id="5" name="TextBox 4"/>
+          <p:cNvSpPr txBox="1"/>
           <p:nvPr/>
         </p:nvSpPr>
         <p:spPr>
           <a:xfrm>
-            <a:off x="6664709" y="6308209"/>
-            <a:ext cx="5198987" cy="369332"/>
+            <a:off x="2501382" y="1759111"/>
+            <a:ext cx="7673126" cy="4187989"/>
           </a:xfrm>
           <a:prstGeom prst="rect">
             <a:avLst/>
           </a:prstGeom>
+          <a:solidFill>
+            <a:srgbClr val="0000FF">
+              <a:alpha val="25000"/>
+            </a:srgbClr>
+          </a:solidFill>
+          <a:ln>
+            <a:solidFill>
+              <a:srgbClr val="0000FF"/>
+            </a:solidFill>
+          </a:ln>
+          <a:effectLst>
+            <a:glow rad="101600">
+              <a:schemeClr val="accent1">
+                <a:lumMod val="60000"/>
+                <a:lumOff val="40000"/>
+                <a:alpha val="75000"/>
+              </a:schemeClr>
+            </a:glow>
+          </a:effectLst>
+          <a:scene3d>
+            <a:camera prst="orthographicFront"/>
+            <a:lightRig rig="threePt" dir="t"/>
+          </a:scene3d>
+          <a:sp3d>
+            <a:bevelT/>
+          </a:sp3d>
         </p:spPr>
         <p:txBody>
-          <a:bodyPr wrap="none">
+          <a:bodyPr wrap="square" lIns="331811" tIns="331811" rIns="331811" bIns="331811" rtlCol="0">
             <a:spAutoFit/>
           </a:bodyPr>
           <a:lstStyle/>
           <a:p>
             <a:r>
-              <a:rPr lang="en-US" dirty="0">
-                <a:hlinkClick r:id="rId3"/>
+              <a:rPr lang="en-US" sz="2540" dirty="0"/>
+              <a:t>Spend the time (and money) planning and producing </a:t>
+            </a:r>
+            <a:r>
+              <a:rPr lang="en-US" sz="2540" b="1" dirty="0"/>
+              <a:t>good quality, accurate and sufficient data.</a:t>
+            </a:r>
+          </a:p>
+          <a:p>
+            <a:endParaRPr lang="en-US" sz="2540" dirty="0"/>
+          </a:p>
+          <a:p>
+            <a:r>
+              <a:rPr lang="en-US" sz="2540" dirty="0"/>
+              <a:t>Get to know to the data, develop and test expectations, explore and identify patterns.</a:t>
+            </a:r>
+          </a:p>
+          <a:p>
+            <a:endParaRPr lang="en-US" sz="2540" dirty="0"/>
+          </a:p>
+          <a:p>
+            <a:r>
+              <a:rPr lang="en-US" sz="2540" dirty="0"/>
+              <a:t>Result, </a:t>
+            </a:r>
+            <a:r>
+              <a:rPr lang="en-US" sz="2540" b="1" dirty="0">
+                <a:solidFill>
+                  <a:srgbClr val="000000"/>
+                </a:solidFill>
               </a:rPr>
-              <a:t>https://www.nature.com/articles/s41592-019-0433-8</a:t>
-            </a:r>
-            <a:endParaRPr lang="en-US" dirty="0"/>
+              <a:t>spend much less time </a:t>
+            </a:r>
+            <a:r>
+              <a:rPr lang="en-US" sz="2540" dirty="0"/>
+              <a:t>(and less money) extracting biological significance and results with fewer failures and reproducible research. </a:t>
+            </a:r>
+            <a:endParaRPr lang="en-US" sz="2540" kern="3000" dirty="0"/>
           </a:p>
         </p:txBody>
       </p:sp>
     </p:spTree>
     <p:extLst>
       <p:ext uri="{BB962C8B-B14F-4D97-AF65-F5344CB8AC3E}">
-        <p14:creationId xmlns:p14="http://schemas.microsoft.com/office/powerpoint/2010/main" val="1184797171"/>
+        <p14:creationId xmlns:p14="http://schemas.microsoft.com/office/powerpoint/2010/main" val="4281829764"/>
       </p:ext>
     </p:extLst>
   </p:cSld>
@@ -6387,272 +6326,6 @@
 </p:sld>
 </file>
 
-<file path=ppt/slides/slide20.xml><?xml version="1.0" encoding="utf-8"?>
-<p:sld xmlns:a="http://schemas.openxmlformats.org/drawingml/2006/main" xmlns:r="http://schemas.openxmlformats.org/officeDocument/2006/relationships" xmlns:p="http://schemas.openxmlformats.org/presentationml/2006/main">
-  <p:cSld>
-    <p:spTree>
-      <p:nvGrpSpPr>
-        <p:cNvPr id="1" name=""/>
-        <p:cNvGrpSpPr/>
-        <p:nvPr/>
-      </p:nvGrpSpPr>
-      <p:grpSpPr>
-        <a:xfrm>
-          <a:off x="0" y="0"/>
-          <a:ext cx="0" cy="0"/>
-          <a:chOff x="0" y="0"/>
-          <a:chExt cx="0" cy="0"/>
-        </a:xfrm>
-      </p:grpSpPr>
-      <p:sp>
-        <p:nvSpPr>
-          <p:cNvPr id="2" name="Title 1"/>
-          <p:cNvSpPr>
-            <a:spLocks noGrp="1"/>
-          </p:cNvSpPr>
-          <p:nvPr>
-            <p:ph type="title"/>
-          </p:nvPr>
-        </p:nvSpPr>
-        <p:spPr/>
-        <p:txBody>
-          <a:bodyPr/>
-          <a:lstStyle/>
-          <a:p>
-            <a:r>
-              <a:rPr lang="en-US" dirty="0"/>
-              <a:t>Be Consistent</a:t>
-            </a:r>
-          </a:p>
-        </p:txBody>
-      </p:sp>
-      <p:sp>
-        <p:nvSpPr>
-          <p:cNvPr id="4" name="Rectangle 3"/>
-          <p:cNvSpPr/>
-          <p:nvPr/>
-        </p:nvSpPr>
-        <p:spPr>
-          <a:xfrm>
-            <a:off x="1307756" y="2504702"/>
-            <a:ext cx="9576487" cy="2993183"/>
-          </a:xfrm>
-          <a:prstGeom prst="rect">
-            <a:avLst/>
-          </a:prstGeom>
-          <a:solidFill>
-            <a:schemeClr val="accent6">
-              <a:lumMod val="40000"/>
-              <a:lumOff val="60000"/>
-            </a:schemeClr>
-          </a:solidFill>
-          <a:ln>
-            <a:solidFill>
-              <a:schemeClr val="accent6">
-                <a:lumMod val="60000"/>
-                <a:lumOff val="40000"/>
-              </a:schemeClr>
-            </a:solidFill>
-          </a:ln>
-        </p:spPr>
-        <p:style>
-          <a:lnRef idx="1">
-            <a:schemeClr val="accent1"/>
-          </a:lnRef>
-          <a:fillRef idx="3">
-            <a:schemeClr val="accent1"/>
-          </a:fillRef>
-          <a:effectRef idx="2">
-            <a:schemeClr val="accent1"/>
-          </a:effectRef>
-          <a:fontRef idx="minor">
-            <a:schemeClr val="lt1"/>
-          </a:fontRef>
-        </p:style>
-        <p:txBody>
-          <a:bodyPr rtlCol="0" anchor="ctr"/>
-          <a:lstStyle/>
-          <a:p>
-            <a:pPr algn="ctr"/>
-            <a:r>
-              <a:rPr lang="en-US" sz="4400" dirty="0">
-                <a:solidFill>
-                  <a:srgbClr val="FF0000"/>
-                </a:solidFill>
-              </a:rPr>
-              <a:t>BE CONSISTENT ACROSS ALL SAMPLES!!! </a:t>
-            </a:r>
-          </a:p>
-        </p:txBody>
-      </p:sp>
-    </p:spTree>
-    <p:extLst>
-      <p:ext uri="{BB962C8B-B14F-4D97-AF65-F5344CB8AC3E}">
-        <p14:creationId xmlns:p14="http://schemas.microsoft.com/office/powerpoint/2010/main" val="2097040103"/>
-      </p:ext>
-    </p:extLst>
-  </p:cSld>
-  <p:clrMapOvr>
-    <a:masterClrMapping/>
-  </p:clrMapOvr>
-</p:sld>
-</file>
-
-<file path=ppt/slides/slide21.xml><?xml version="1.0" encoding="utf-8"?>
-<p:sld xmlns:a="http://schemas.openxmlformats.org/drawingml/2006/main" xmlns:r="http://schemas.openxmlformats.org/officeDocument/2006/relationships" xmlns:p="http://schemas.openxmlformats.org/presentationml/2006/main">
-  <p:cSld>
-    <p:spTree>
-      <p:nvGrpSpPr>
-        <p:cNvPr id="1" name=""/>
-        <p:cNvGrpSpPr/>
-        <p:nvPr/>
-      </p:nvGrpSpPr>
-      <p:grpSpPr>
-        <a:xfrm>
-          <a:off x="0" y="0"/>
-          <a:ext cx="0" cy="0"/>
-          <a:chOff x="0" y="0"/>
-          <a:chExt cx="0" cy="0"/>
-        </a:xfrm>
-      </p:grpSpPr>
-      <p:sp>
-        <p:nvSpPr>
-          <p:cNvPr id="2" name="Title 1"/>
-          <p:cNvSpPr>
-            <a:spLocks noGrp="1"/>
-          </p:cNvSpPr>
-          <p:nvPr>
-            <p:ph type="title"/>
-          </p:nvPr>
-        </p:nvSpPr>
-        <p:spPr>
-          <a:xfrm>
-            <a:off x="2501384" y="273630"/>
-            <a:ext cx="7674566" cy="1143480"/>
-          </a:xfrm>
-        </p:spPr>
-        <p:txBody>
-          <a:bodyPr>
-            <a:normAutofit fontScale="90000"/>
-          </a:bodyPr>
-          <a:lstStyle/>
-          <a:p>
-            <a:r>
-              <a:rPr lang="en-US" b="1" dirty="0"/>
-              <a:t>The Bottom Line:</a:t>
-            </a:r>
-            <a:br>
-              <a:rPr lang="en-US" b="1" dirty="0"/>
-            </a:br>
-            <a:r>
-              <a:rPr lang="en-US" sz="4355" dirty="0"/>
-              <a:t>In Genomics</a:t>
-            </a:r>
-          </a:p>
-        </p:txBody>
-      </p:sp>
-      <p:sp>
-        <p:nvSpPr>
-          <p:cNvPr id="5" name="TextBox 4"/>
-          <p:cNvSpPr txBox="1"/>
-          <p:nvPr/>
-        </p:nvSpPr>
-        <p:spPr>
-          <a:xfrm>
-            <a:off x="2501382" y="1759111"/>
-            <a:ext cx="7673126" cy="4187989"/>
-          </a:xfrm>
-          <a:prstGeom prst="rect">
-            <a:avLst/>
-          </a:prstGeom>
-          <a:solidFill>
-            <a:srgbClr val="0000FF">
-              <a:alpha val="25000"/>
-            </a:srgbClr>
-          </a:solidFill>
-          <a:ln>
-            <a:solidFill>
-              <a:srgbClr val="0000FF"/>
-            </a:solidFill>
-          </a:ln>
-          <a:effectLst>
-            <a:glow rad="101600">
-              <a:schemeClr val="accent1">
-                <a:lumMod val="60000"/>
-                <a:lumOff val="40000"/>
-                <a:alpha val="75000"/>
-              </a:schemeClr>
-            </a:glow>
-          </a:effectLst>
-          <a:scene3d>
-            <a:camera prst="orthographicFront"/>
-            <a:lightRig rig="threePt" dir="t"/>
-          </a:scene3d>
-          <a:sp3d>
-            <a:bevelT/>
-          </a:sp3d>
-        </p:spPr>
-        <p:txBody>
-          <a:bodyPr wrap="square" lIns="331811" tIns="331811" rIns="331811" bIns="331811" rtlCol="0">
-            <a:spAutoFit/>
-          </a:bodyPr>
-          <a:lstStyle/>
-          <a:p>
-            <a:r>
-              <a:rPr lang="en-US" sz="2540" dirty="0"/>
-              <a:t>Spend the time (and money) planning and producing </a:t>
-            </a:r>
-            <a:r>
-              <a:rPr lang="en-US" sz="2540" b="1" dirty="0"/>
-              <a:t>good quality, accurate and sufficient data.</a:t>
-            </a:r>
-          </a:p>
-          <a:p>
-            <a:endParaRPr lang="en-US" sz="2540" dirty="0"/>
-          </a:p>
-          <a:p>
-            <a:r>
-              <a:rPr lang="en-US" sz="2540" dirty="0"/>
-              <a:t>Get to know to the data, develop and test expectations, explore and identify patterns.</a:t>
-            </a:r>
-          </a:p>
-          <a:p>
-            <a:endParaRPr lang="en-US" sz="2540" dirty="0"/>
-          </a:p>
-          <a:p>
-            <a:r>
-              <a:rPr lang="en-US" sz="2540" dirty="0"/>
-              <a:t>Result, </a:t>
-            </a:r>
-            <a:r>
-              <a:rPr lang="en-US" sz="2540" b="1" dirty="0">
-                <a:solidFill>
-                  <a:srgbClr val="000000"/>
-                </a:solidFill>
-              </a:rPr>
-              <a:t>spend much less time </a:t>
-            </a:r>
-            <a:r>
-              <a:rPr lang="en-US" sz="2540" dirty="0"/>
-              <a:t>(and less money) extracting biological significance and results with fewer failures and reproducible research. </a:t>
-            </a:r>
-            <a:endParaRPr lang="en-US" sz="2540" kern="3000" dirty="0"/>
-          </a:p>
-        </p:txBody>
-      </p:sp>
-    </p:spTree>
-    <p:extLst>
-      <p:ext uri="{BB962C8B-B14F-4D97-AF65-F5344CB8AC3E}">
-        <p14:creationId xmlns:p14="http://schemas.microsoft.com/office/powerpoint/2010/main" val="4281829764"/>
-      </p:ext>
-    </p:extLst>
-  </p:cSld>
-  <p:clrMapOvr>
-    <a:masterClrMapping/>
-  </p:clrMapOvr>
-</p:sld>
-</file>
-
 <file path=ppt/slides/slide3.xml><?xml version="1.0" encoding="utf-8"?>
 <p:sld xmlns:a="http://schemas.openxmlformats.org/drawingml/2006/main" xmlns:r="http://schemas.openxmlformats.org/officeDocument/2006/relationships" xmlns:p="http://schemas.openxmlformats.org/presentationml/2006/main">
   <p:cSld>
@@ -6927,138 +6600,6 @@
           <p:cNvPr id="2" name="Title 1">
             <a:extLst>
               <a:ext uri="{FF2B5EF4-FFF2-40B4-BE49-F238E27FC236}">
-                <a16:creationId xmlns:a16="http://schemas.microsoft.com/office/drawing/2014/main" id="{39EA801D-4556-114F-BAD7-77A2C0802648}"/>
-              </a:ext>
-            </a:extLst>
-          </p:cNvPr>
-          <p:cNvSpPr>
-            <a:spLocks noGrp="1"/>
-          </p:cNvSpPr>
-          <p:nvPr>
-            <p:ph type="title"/>
-          </p:nvPr>
-        </p:nvSpPr>
-        <p:spPr/>
-        <p:txBody>
-          <a:bodyPr/>
-          <a:lstStyle/>
-          <a:p>
-            <a:r>
-              <a:rPr lang="en-US" dirty="0"/>
-              <a:t>Multiplexing (</a:t>
-            </a:r>
-            <a:r>
-              <a:rPr lang="en-US" dirty="0" err="1"/>
-              <a:t>MULTIseq</a:t>
-            </a:r>
-            <a:r>
-              <a:rPr lang="en-US" dirty="0"/>
-              <a:t>)</a:t>
-            </a:r>
-          </a:p>
-        </p:txBody>
-      </p:sp>
-      <p:pic>
-        <p:nvPicPr>
-          <p:cNvPr id="6" name="Content Placeholder 5" descr="A close up of a map&#10;&#10;Description automatically generated">
-            <a:extLst>
-              <a:ext uri="{FF2B5EF4-FFF2-40B4-BE49-F238E27FC236}">
-                <a16:creationId xmlns:a16="http://schemas.microsoft.com/office/drawing/2014/main" id="{81A6D0C7-9275-C545-9E89-9E07734DD29C}"/>
-              </a:ext>
-            </a:extLst>
-          </p:cNvPr>
-          <p:cNvPicPr>
-            <a:picLocks noGrp="1" noChangeAspect="1"/>
-          </p:cNvPicPr>
-          <p:nvPr>
-            <p:ph idx="1"/>
-          </p:nvPr>
-        </p:nvPicPr>
-        <p:blipFill>
-          <a:blip r:embed="rId2"/>
-          <a:stretch>
-            <a:fillRect/>
-          </a:stretch>
-        </p:blipFill>
-        <p:spPr>
-          <a:xfrm>
-            <a:off x="3152760" y="1376266"/>
-            <a:ext cx="6549712" cy="5296724"/>
-          </a:xfrm>
-        </p:spPr>
-      </p:pic>
-      <p:sp>
-        <p:nvSpPr>
-          <p:cNvPr id="4" name="Rectangle 3">
-            <a:extLst>
-              <a:ext uri="{FF2B5EF4-FFF2-40B4-BE49-F238E27FC236}">
-                <a16:creationId xmlns:a16="http://schemas.microsoft.com/office/drawing/2014/main" id="{ECFF052D-B254-6145-B820-C63B4CDD7945}"/>
-              </a:ext>
-            </a:extLst>
-          </p:cNvPr>
-          <p:cNvSpPr/>
-          <p:nvPr/>
-        </p:nvSpPr>
-        <p:spPr>
-          <a:xfrm>
-            <a:off x="6886382" y="180459"/>
-            <a:ext cx="5198987" cy="369332"/>
-          </a:xfrm>
-          <a:prstGeom prst="rect">
-            <a:avLst/>
-          </a:prstGeom>
-        </p:spPr>
-        <p:txBody>
-          <a:bodyPr wrap="none">
-            <a:spAutoFit/>
-          </a:bodyPr>
-          <a:lstStyle/>
-          <a:p>
-            <a:r>
-              <a:rPr lang="en-US" dirty="0">
-                <a:hlinkClick r:id="rId3"/>
-              </a:rPr>
-              <a:t>https://www.nature.com/articles/s41592-019-0433-8</a:t>
-            </a:r>
-            <a:endParaRPr lang="en-US" dirty="0"/>
-          </a:p>
-        </p:txBody>
-      </p:sp>
-    </p:spTree>
-    <p:extLst>
-      <p:ext uri="{BB962C8B-B14F-4D97-AF65-F5344CB8AC3E}">
-        <p14:creationId xmlns:p14="http://schemas.microsoft.com/office/powerpoint/2010/main" val="3426494592"/>
-      </p:ext>
-    </p:extLst>
-  </p:cSld>
-  <p:clrMapOvr>
-    <a:masterClrMapping/>
-  </p:clrMapOvr>
-</p:sld>
-</file>
-
-<file path=ppt/slides/slide6.xml><?xml version="1.0" encoding="utf-8"?>
-<p:sld xmlns:a="http://schemas.openxmlformats.org/drawingml/2006/main" xmlns:r="http://schemas.openxmlformats.org/officeDocument/2006/relationships" xmlns:p="http://schemas.openxmlformats.org/presentationml/2006/main">
-  <p:cSld>
-    <p:spTree>
-      <p:nvGrpSpPr>
-        <p:cNvPr id="1" name=""/>
-        <p:cNvGrpSpPr/>
-        <p:nvPr/>
-      </p:nvGrpSpPr>
-      <p:grpSpPr>
-        <a:xfrm>
-          <a:off x="0" y="0"/>
-          <a:ext cx="0" cy="0"/>
-          <a:chOff x="0" y="0"/>
-          <a:chExt cx="0" cy="0"/>
-        </a:xfrm>
-      </p:grpSpPr>
-      <p:sp>
-        <p:nvSpPr>
-          <p:cNvPr id="2" name="Title 1">
-            <a:extLst>
-              <a:ext uri="{FF2B5EF4-FFF2-40B4-BE49-F238E27FC236}">
                 <a16:creationId xmlns:a16="http://schemas.microsoft.com/office/drawing/2014/main" id="{9A53A440-3F66-9B42-9746-183DAC34314C}"/>
               </a:ext>
             </a:extLst>
@@ -7124,7 +6665,7 @@
 </p:sld>
 </file>
 
-<file path=ppt/slides/slide7.xml><?xml version="1.0" encoding="utf-8"?>
+<file path=ppt/slides/slide6.xml><?xml version="1.0" encoding="utf-8"?>
 <p:sld xmlns:a="http://schemas.openxmlformats.org/drawingml/2006/main" xmlns:r="http://schemas.openxmlformats.org/officeDocument/2006/relationships" xmlns:p="http://schemas.openxmlformats.org/presentationml/2006/main">
   <p:cSld>
     <p:spTree>
@@ -7243,6 +6784,139 @@
 </p:sld>
 </file>
 
+<file path=ppt/slides/slide7.xml><?xml version="1.0" encoding="utf-8"?>
+<p:sld xmlns:a="http://schemas.openxmlformats.org/drawingml/2006/main" xmlns:r="http://schemas.openxmlformats.org/officeDocument/2006/relationships" xmlns:p="http://schemas.openxmlformats.org/presentationml/2006/main">
+  <p:cSld>
+    <p:spTree>
+      <p:nvGrpSpPr>
+        <p:cNvPr id="1" name=""/>
+        <p:cNvGrpSpPr/>
+        <p:nvPr/>
+      </p:nvGrpSpPr>
+      <p:grpSpPr>
+        <a:xfrm>
+          <a:off x="0" y="0"/>
+          <a:ext cx="0" cy="0"/>
+          <a:chOff x="0" y="0"/>
+          <a:chExt cx="0" cy="0"/>
+        </a:xfrm>
+      </p:grpSpPr>
+      <p:sp>
+        <p:nvSpPr>
+          <p:cNvPr id="2" name="Title 1"/>
+          <p:cNvSpPr>
+            <a:spLocks noGrp="1"/>
+          </p:cNvSpPr>
+          <p:nvPr>
+            <p:ph type="title"/>
+          </p:nvPr>
+        </p:nvSpPr>
+        <p:spPr/>
+        <p:txBody>
+          <a:bodyPr/>
+          <a:lstStyle/>
+          <a:p>
+            <a:r>
+              <a:rPr lang="en-US" dirty="0"/>
+              <a:t>Designing Experiments</a:t>
+            </a:r>
+          </a:p>
+        </p:txBody>
+      </p:sp>
+      <p:sp>
+        <p:nvSpPr>
+          <p:cNvPr id="3" name="Content Placeholder 2"/>
+          <p:cNvSpPr>
+            <a:spLocks noGrp="1"/>
+          </p:cNvSpPr>
+          <p:nvPr>
+            <p:ph idx="1"/>
+          </p:nvPr>
+        </p:nvSpPr>
+        <p:spPr/>
+        <p:txBody>
+          <a:bodyPr>
+            <a:normAutofit fontScale="92500"/>
+          </a:bodyPr>
+          <a:lstStyle/>
+          <a:p>
+            <a:pPr marL="0" indent="0">
+              <a:buNone/>
+            </a:pPr>
+            <a:r>
+              <a:rPr lang="en-US" dirty="0"/>
+              <a:t>Beginning with the question of interest ( and working backwards )</a:t>
+            </a:r>
+          </a:p>
+          <a:p>
+            <a:r>
+              <a:rPr lang="en-US" dirty="0"/>
+              <a:t>The final step of an analysis is comparisons between sample/conditions, which means the application of a model to each gene in your dataset.</a:t>
+            </a:r>
+          </a:p>
+          <a:p>
+            <a:pPr marL="457200" lvl="1" indent="0">
+              <a:buNone/>
+            </a:pPr>
+            <a:r>
+              <a:rPr lang="en-US" dirty="0"/>
+              <a:t>Traditional statistical considerations and basic principals of statistical design of experiments apply.</a:t>
+            </a:r>
+          </a:p>
+          <a:p>
+            <a:pPr lvl="1"/>
+            <a:r>
+              <a:rPr lang="en-US" b="1" dirty="0"/>
+              <a:t>Control</a:t>
+            </a:r>
+            <a:r>
+              <a:rPr lang="en-US" dirty="0"/>
+              <a:t> for effects of outside variables, avoid/consider possible biases, avoid confounding variables in sample preparation.</a:t>
+            </a:r>
+          </a:p>
+          <a:p>
+            <a:pPr lvl="1"/>
+            <a:r>
+              <a:rPr lang="en-US" b="1" dirty="0"/>
+              <a:t>Randomization</a:t>
+            </a:r>
+            <a:r>
+              <a:rPr lang="en-US" dirty="0"/>
+              <a:t> of samples, plots, etc.</a:t>
+            </a:r>
+          </a:p>
+          <a:p>
+            <a:pPr lvl="1"/>
+            <a:r>
+              <a:rPr lang="en-US" b="1" dirty="0"/>
+              <a:t>Replication</a:t>
+            </a:r>
+            <a:r>
+              <a:rPr lang="en-US" dirty="0"/>
+              <a:t> is essential (triplicates are THE minimum)</a:t>
+            </a:r>
+          </a:p>
+          <a:p>
+            <a:r>
+              <a:rPr lang="en-US" dirty="0"/>
+              <a:t>You should know your final (DE) model and comparison contrasts before beginning your experiment.</a:t>
+            </a:r>
+          </a:p>
+        </p:txBody>
+      </p:sp>
+    </p:spTree>
+    <p:extLst>
+      <p:ext uri="{BB962C8B-B14F-4D97-AF65-F5344CB8AC3E}">
+        <p14:creationId xmlns:p14="http://schemas.microsoft.com/office/powerpoint/2010/main" val="1243112932"/>
+      </p:ext>
+    </p:extLst>
+  </p:cSld>
+  <p:clrMapOvr>
+    <a:masterClrMapping/>
+  </p:clrMapOvr>
+</p:sld>
+</file>
+
 <file path=ppt/slides/slide8.xml><?xml version="1.0" encoding="utf-8"?>
 <p:sld xmlns:a="http://schemas.openxmlformats.org/drawingml/2006/main" xmlns:r="http://schemas.openxmlformats.org/officeDocument/2006/relationships" xmlns:p="http://schemas.openxmlformats.org/presentationml/2006/main">
   <p:cSld>
@@ -7262,7 +6936,13 @@
       </p:grpSpPr>
       <p:sp>
         <p:nvSpPr>
-          <p:cNvPr id="2" name="Title 1"/>
+          <p:cNvPr id="2" name="Title 1">
+            <a:extLst>
+              <a:ext uri="{FF2B5EF4-FFF2-40B4-BE49-F238E27FC236}">
+                <a16:creationId xmlns:a16="http://schemas.microsoft.com/office/drawing/2014/main" id="{E8251EE2-FDD1-F547-B9A8-EF9ECBB259FD}"/>
+              </a:ext>
+            </a:extLst>
+          </p:cNvPr>
           <p:cNvSpPr>
             <a:spLocks noGrp="1"/>
           </p:cNvSpPr>
@@ -7277,14 +6957,20 @@
           <a:p>
             <a:r>
               <a:rPr lang="en-US" dirty="0"/>
-              <a:t>Designing Experiments</a:t>
-            </a:r>
-          </a:p>
-        </p:txBody>
-      </p:sp>
-      <p:sp>
-        <p:nvSpPr>
-          <p:cNvPr id="3" name="Content Placeholder 2"/>
+              <a:t>How many cells to target?</a:t>
+            </a:r>
+          </a:p>
+        </p:txBody>
+      </p:sp>
+      <p:sp>
+        <p:nvSpPr>
+          <p:cNvPr id="3" name="Content Placeholder 2">
+            <a:extLst>
+              <a:ext uri="{FF2B5EF4-FFF2-40B4-BE49-F238E27FC236}">
+                <a16:creationId xmlns:a16="http://schemas.microsoft.com/office/drawing/2014/main" id="{2C9E58D1-783B-EE4E-B184-F1E19E11BB0B}"/>
+              </a:ext>
+            </a:extLst>
+          </p:cNvPr>
           <p:cNvSpPr>
             <a:spLocks noGrp="1"/>
           </p:cNvSpPr>
@@ -7295,86 +6981,96 @@
         <p:spPr/>
         <p:txBody>
           <a:bodyPr>
-            <a:normAutofit lnSpcReduction="10000"/>
+            <a:normAutofit fontScale="92500"/>
           </a:bodyPr>
           <a:lstStyle/>
           <a:p>
-            <a:pPr marL="0" indent="0">
-              <a:buNone/>
-            </a:pPr>
             <a:r>
               <a:rPr lang="en-US" dirty="0"/>
-              <a:t>Beginning with the question of interest ( and working backwards )</a:t>
-            </a:r>
-          </a:p>
-          <a:p>
+              <a:t>The number of cells to target can be estimated based on:</a:t>
+            </a:r>
+          </a:p>
+          <a:p>
+            <a:pPr lvl="1"/>
             <a:r>
               <a:rPr lang="en-US" dirty="0"/>
-              <a:t>The final step of a DE analysis is the application of a linear model to each gene in your dataset.</a:t>
-            </a:r>
-          </a:p>
-          <a:p>
-            <a:pPr marL="457200" lvl="1" indent="0">
-              <a:buNone/>
-            </a:pPr>
+              <a:t>The expected heterogeneity of all cells in a sample</a:t>
+            </a:r>
+          </a:p>
+          <a:p>
+            <a:pPr lvl="1"/>
             <a:r>
               <a:rPr lang="en-US" dirty="0"/>
-              <a:t>Traditional statistical considerations and basic principals of statistical design of experiments apply.</a:t>
+              <a:t>The minimum frequency expected of a particular cell type within the sample, and</a:t>
             </a:r>
           </a:p>
           <a:p>
             <a:pPr lvl="1"/>
             <a:r>
-              <a:rPr lang="en-US" b="1" dirty="0"/>
-              <a:t>Control</a:t>
-            </a:r>
-            <a:r>
               <a:rPr lang="en-US" dirty="0"/>
-              <a:t> for effects of outside variables, avoid/consider possible biases, avoid confounding variables in sample preparation.</a:t>
-            </a:r>
-          </a:p>
-          <a:p>
-            <a:pPr lvl="1"/>
-            <a:r>
-              <a:rPr lang="en-US" b="1" dirty="0"/>
-              <a:t>Randomization</a:t>
-            </a:r>
+              <a:t>The minimum number of cells of each type desired in the resulting data set. </a:t>
+            </a:r>
+          </a:p>
+          <a:p>
             <a:r>
               <a:rPr lang="en-US" dirty="0"/>
-              <a:t> of samples, plots, etc.</a:t>
-            </a:r>
-          </a:p>
-          <a:p>
-            <a:pPr lvl="1"/>
-            <a:r>
-              <a:rPr lang="en-US" b="1" dirty="0"/>
-              <a:t>Replication</a:t>
-            </a:r>
+              <a:t>With this information, a negative binomial distribution can be used to estimate the number of cells likely to capture at least a set number of cells from your rarest cell type.</a:t>
+            </a:r>
+            <a:endParaRPr lang="en-US" sz="2000" dirty="0"/>
+          </a:p>
+          <a:p>
             <a:r>
               <a:rPr lang="en-US" dirty="0"/>
-              <a:t> is essential (triplicates are THE minimum)</a:t>
-            </a:r>
-          </a:p>
-          <a:p>
-            <a:r>
-              <a:rPr lang="en-US" dirty="0"/>
-              <a:t>You should know your final </a:t>
-            </a:r>
-            <a:r>
-              <a:rPr lang="en-US"/>
-              <a:t>(DE) </a:t>
-            </a:r>
-            <a:r>
-              <a:rPr lang="en-US" dirty="0"/>
-              <a:t>model and comparison contrasts before beginning your experiment.</a:t>
-            </a:r>
+              <a:t>For example, if we sequence a mixture of ∼10 cell types where the frequency of the rarest cell type is ∼0.03, then we would need to sequence ∼2250 cells to have a 90% chance of capturing at least 50 of those rare cells.</a:t>
+            </a:r>
+          </a:p>
+        </p:txBody>
+      </p:sp>
+      <p:sp>
+        <p:nvSpPr>
+          <p:cNvPr id="4" name="Rectangle 3">
+            <a:extLst>
+              <a:ext uri="{FF2B5EF4-FFF2-40B4-BE49-F238E27FC236}">
+                <a16:creationId xmlns:a16="http://schemas.microsoft.com/office/drawing/2014/main" id="{F453792C-244B-D44E-B54F-391CBBC040FC}"/>
+              </a:ext>
+            </a:extLst>
+          </p:cNvPr>
+          <p:cNvSpPr/>
+          <p:nvPr/>
+        </p:nvSpPr>
+        <p:spPr>
+          <a:xfrm>
+            <a:off x="7539638" y="6081067"/>
+            <a:ext cx="4329840" cy="461665"/>
+          </a:xfrm>
+          <a:prstGeom prst="rect">
+            <a:avLst/>
+          </a:prstGeom>
+        </p:spPr>
+        <p:txBody>
+          <a:bodyPr wrap="none">
+            <a:spAutoFit/>
+          </a:bodyPr>
+          <a:lstStyle/>
+          <a:p>
+            <a:r>
+              <a:rPr lang="en-US" sz="2400" u="sng" dirty="0">
+                <a:solidFill>
+                  <a:srgbClr val="006FB7"/>
+                </a:solidFill>
+                <a:latin typeface="Merriweather"/>
+                <a:hlinkClick r:id="rId2"/>
+              </a:rPr>
+              <a:t>www.satijalab.org/howmanycells</a:t>
+            </a:r>
+            <a:endParaRPr lang="en-US" sz="2400" dirty="0"/>
           </a:p>
         </p:txBody>
       </p:sp>
     </p:spTree>
     <p:extLst>
       <p:ext uri="{BB962C8B-B14F-4D97-AF65-F5344CB8AC3E}">
-        <p14:creationId xmlns:p14="http://schemas.microsoft.com/office/powerpoint/2010/main" val="1243112932"/>
+        <p14:creationId xmlns:p14="http://schemas.microsoft.com/office/powerpoint/2010/main" val="411868624"/>
       </p:ext>
     </p:extLst>
   </p:cSld>
@@ -7403,13 +7099,7 @@
       </p:grpSpPr>
       <p:sp>
         <p:nvSpPr>
-          <p:cNvPr id="2" name="Title 1">
-            <a:extLst>
-              <a:ext uri="{FF2B5EF4-FFF2-40B4-BE49-F238E27FC236}">
-                <a16:creationId xmlns:a16="http://schemas.microsoft.com/office/drawing/2014/main" id="{E8251EE2-FDD1-F547-B9A8-EF9ECBB259FD}"/>
-              </a:ext>
-            </a:extLst>
-          </p:cNvPr>
+          <p:cNvPr id="3" name="Title 2"/>
           <p:cNvSpPr>
             <a:spLocks noGrp="1"/>
           </p:cNvSpPr>
@@ -7424,120 +7114,74 @@
           <a:p>
             <a:r>
               <a:rPr lang="en-US" dirty="0"/>
-              <a:t>How many cells to target?</a:t>
-            </a:r>
-          </a:p>
-        </p:txBody>
-      </p:sp>
-      <p:sp>
-        <p:nvSpPr>
-          <p:cNvPr id="3" name="Content Placeholder 2">
-            <a:extLst>
-              <a:ext uri="{FF2B5EF4-FFF2-40B4-BE49-F238E27FC236}">
-                <a16:creationId xmlns:a16="http://schemas.microsoft.com/office/drawing/2014/main" id="{2C9E58D1-783B-EE4E-B184-F1E19E11BB0B}"/>
-              </a:ext>
-            </a:extLst>
-          </p:cNvPr>
+              <a:t>General rules for preparing samples</a:t>
+            </a:r>
+          </a:p>
+        </p:txBody>
+      </p:sp>
+      <p:sp>
+        <p:nvSpPr>
+          <p:cNvPr id="2" name="Content Placeholder 1"/>
           <p:cNvSpPr>
             <a:spLocks noGrp="1"/>
           </p:cNvSpPr>
           <p:nvPr>
             <p:ph idx="1"/>
           </p:nvPr>
-        </p:nvSpPr>
-        <p:spPr/>
-        <p:txBody>
-          <a:bodyPr>
-            <a:normAutofit fontScale="92500"/>
-          </a:bodyPr>
-          <a:lstStyle/>
-          <a:p>
-            <a:r>
-              <a:rPr lang="en-US" dirty="0"/>
-              <a:t>The number of cells to target can be estimated based on:</a:t>
-            </a:r>
-          </a:p>
-          <a:p>
-            <a:pPr lvl="1"/>
-            <a:r>
-              <a:rPr lang="en-US" dirty="0"/>
-              <a:t>The expected heterogeneity of all cells in a sample</a:t>
-            </a:r>
-          </a:p>
-          <a:p>
-            <a:pPr lvl="1"/>
-            <a:r>
-              <a:rPr lang="en-US" dirty="0"/>
-              <a:t>The minimum frequency expected of a particular cell type within the sample, and</a:t>
-            </a:r>
-          </a:p>
-          <a:p>
-            <a:pPr lvl="1"/>
-            <a:r>
-              <a:rPr lang="en-US" dirty="0"/>
-              <a:t>The minimum number of cells of each type desired in the resulting data set. </a:t>
-            </a:r>
-          </a:p>
-          <a:p>
-            <a:r>
-              <a:rPr lang="en-US" dirty="0"/>
-              <a:t>With this information, a negative binomial distribution can be used to estimate the number of cells likely to capture at least a set number of cells from your rarest cell type.</a:t>
-            </a:r>
-            <a:endParaRPr lang="en-US" sz="2000" dirty="0"/>
-          </a:p>
-          <a:p>
-            <a:r>
-              <a:rPr lang="en-US" dirty="0"/>
-              <a:t>For example, if we sequence a mixture of ∼10 cell types where the frequency of the rarest cell type is ∼0.03, then we would need to sequence ∼2200 cells to have a 90% chance of capturing at least 50 of those rare cells.</a:t>
-            </a:r>
-          </a:p>
-        </p:txBody>
-      </p:sp>
-      <p:sp>
-        <p:nvSpPr>
-          <p:cNvPr id="4" name="Rectangle 3">
-            <a:extLst>
-              <a:ext uri="{FF2B5EF4-FFF2-40B4-BE49-F238E27FC236}">
-                <a16:creationId xmlns:a16="http://schemas.microsoft.com/office/drawing/2014/main" id="{F453792C-244B-D44E-B54F-391CBBC040FC}"/>
-              </a:ext>
-            </a:extLst>
-          </p:cNvPr>
-          <p:cNvSpPr/>
-          <p:nvPr/>
         </p:nvSpPr>
         <p:spPr>
           <a:xfrm>
-            <a:off x="7230148" y="6154832"/>
-            <a:ext cx="4329840" cy="461665"/>
+            <a:off x="1020726" y="1690688"/>
+            <a:ext cx="10100930" cy="4347041"/>
           </a:xfrm>
-          <a:prstGeom prst="rect">
-            <a:avLst/>
-          </a:prstGeom>
         </p:spPr>
         <p:txBody>
-          <a:bodyPr wrap="none">
-            <a:spAutoFit/>
+          <a:bodyPr>
+            <a:noAutofit/>
           </a:bodyPr>
           <a:lstStyle/>
           <a:p>
             <a:r>
-              <a:rPr lang="en-US" sz="2400" u="sng" dirty="0">
-                <a:solidFill>
-                  <a:srgbClr val="006FB7"/>
-                </a:solidFill>
-                <a:latin typeface="Merriweather"/>
-                <a:hlinkClick r:id="rId2"/>
-              </a:rPr>
-              <a:t>www.satijalab.org/howmanycells</a:t>
-            </a:r>
-            <a:endParaRPr lang="en-US" sz="2400" dirty="0"/>
+              <a:rPr lang="en-US" sz="2400" dirty="0"/>
+              <a:t>Prepare more samples then you are going to need, i.e. expect some will be of poor quality, or fail </a:t>
+            </a:r>
+          </a:p>
+          <a:p>
+            <a:r>
+              <a:rPr lang="en-US" sz="2400" dirty="0"/>
+              <a:t>Preparation stages should occur across all samples at the same time (or as close as possible) and by the same person</a:t>
+            </a:r>
+          </a:p>
+          <a:p>
+            <a:r>
+              <a:rPr lang="en-US" sz="2400" dirty="0"/>
+              <a:t>Spend time practicing a new technique to produce the highest quality product you can, reliably</a:t>
+            </a:r>
+          </a:p>
+          <a:p>
+            <a:r>
+              <a:rPr lang="en-US" sz="2400" dirty="0"/>
+              <a:t>If cells clumps or cell debris are observed, filter cells using a cell strainer with an appropriate pore size</a:t>
+            </a:r>
+          </a:p>
+          <a:p>
+            <a:r>
+              <a:rPr lang="en-US" sz="2400" dirty="0"/>
+              <a:t>Determine the cell concentration using a Countess® II Automated Cell Counter or other cell counting device</a:t>
+            </a:r>
+          </a:p>
+          <a:p>
+            <a:r>
+              <a:rPr lang="en-US" sz="2400" dirty="0"/>
+              <a:t>Initial cell count depends on the target, however, expect at least 50% loss in the final stages and loss during cleanup</a:t>
+            </a:r>
           </a:p>
         </p:txBody>
       </p:sp>
     </p:spTree>
     <p:extLst>
       <p:ext uri="{BB962C8B-B14F-4D97-AF65-F5344CB8AC3E}">
-        <p14:creationId xmlns:p14="http://schemas.microsoft.com/office/powerpoint/2010/main" val="411868624"/>
+        <p14:creationId xmlns:p14="http://schemas.microsoft.com/office/powerpoint/2010/main" val="569050726"/>
       </p:ext>
     </p:extLst>
   </p:cSld>

</xml_diff>